<commit_message>
Added visual win/loss paths to the diagram, and converted it into a pdf
</commit_message>
<xml_diff>
--- a/Project Two/textGameDiagram.pptx
+++ b/Project Two/textGameDiagram.pptx
@@ -6,6 +6,7 @@
   </p:sldMasterIdLst>
   <p:sldIdLst>
     <p:sldId id="256" r:id="rId2"/>
+    <p:sldId id="257" r:id="rId3"/>
   </p:sldIdLst>
   <p:sldSz cx="12192000" cy="6858000"/>
   <p:notesSz cx="6858000" cy="9144000"/>
@@ -104,6 +105,11 @@
       </a:defRPr>
     </a:lvl9pPr>
   </p:defaultTextStyle>
+  <p:extLst>
+    <p:ext uri="{EFAFB233-063F-42B5-8137-9DF3F51BA10A}">
+      <p15:sldGuideLst xmlns:p15="http://schemas.microsoft.com/office/powerpoint/2012/main"/>
+    </p:ext>
+  </p:extLst>
 </p:presentation>
 </file>
 
@@ -5677,7 +5683,7 @@
         <p:spPr>
           <a:xfrm>
             <a:off x="3248117" y="3037365"/>
-            <a:ext cx="795377" cy="338554"/>
+            <a:ext cx="988693" cy="338554"/>
           </a:xfrm>
           <a:prstGeom prst="rect">
             <a:avLst/>
@@ -5692,7 +5698,7 @@
           <a:p>
             <a:r>
               <a:rPr lang="en-US" sz="800" dirty="0"/>
-              <a:t>You found $5! money + 5</a:t>
+              <a:t>You found $10! money + 10</a:t>
             </a:r>
           </a:p>
         </p:txBody>
@@ -9188,6 +9194,259 @@
     <p:extLst>
       <p:ext uri="{BB962C8B-B14F-4D97-AF65-F5344CB8AC3E}">
         <p14:creationId xmlns:p14="http://schemas.microsoft.com/office/powerpoint/2010/main" val="3693364776"/>
+      </p:ext>
+    </p:extLst>
+  </p:cSld>
+  <p:clrMapOvr>
+    <a:masterClrMapping/>
+  </p:clrMapOvr>
+</p:sld>
+</file>
+
+<file path=ppt/slides/slide2.xml><?xml version="1.0" encoding="utf-8"?>
+<p:sld xmlns:a="http://schemas.openxmlformats.org/drawingml/2006/main" xmlns:r="http://schemas.openxmlformats.org/officeDocument/2006/relationships" xmlns:p="http://schemas.openxmlformats.org/presentationml/2006/main">
+  <p:cSld>
+    <p:spTree>
+      <p:nvGrpSpPr>
+        <p:cNvPr id="1" name=""/>
+        <p:cNvGrpSpPr/>
+        <p:nvPr/>
+      </p:nvGrpSpPr>
+      <p:grpSpPr>
+        <a:xfrm>
+          <a:off x="0" y="0"/>
+          <a:ext cx="0" cy="0"/>
+          <a:chOff x="0" y="0"/>
+          <a:chExt cx="0" cy="0"/>
+        </a:xfrm>
+      </p:grpSpPr>
+      <p:sp>
+        <p:nvSpPr>
+          <p:cNvPr id="2" name="TextBox 1">
+            <a:extLst>
+              <a:ext uri="{FF2B5EF4-FFF2-40B4-BE49-F238E27FC236}">
+                <a16:creationId xmlns:a16="http://schemas.microsoft.com/office/drawing/2014/main" id="{A9747555-A0A0-46D5-863F-4729349D2E1C}"/>
+              </a:ext>
+            </a:extLst>
+          </p:cNvPr>
+          <p:cNvSpPr txBox="1"/>
+          <p:nvPr/>
+        </p:nvSpPr>
+        <p:spPr>
+          <a:xfrm>
+            <a:off x="192947" y="276837"/>
+            <a:ext cx="11887200" cy="584775"/>
+          </a:xfrm>
+          <a:prstGeom prst="rect">
+            <a:avLst/>
+          </a:prstGeom>
+          <a:noFill/>
+        </p:spPr>
+        <p:txBody>
+          <a:bodyPr wrap="square" rtlCol="0">
+            <a:spAutoFit/>
+          </a:bodyPr>
+          <a:lstStyle/>
+          <a:p>
+            <a:r>
+              <a:rPr lang="en-US" sz="3200" dirty="0"/>
+              <a:t>There are multiple win/loss paths, but these are the two most simple.</a:t>
+            </a:r>
+          </a:p>
+        </p:txBody>
+      </p:sp>
+      <p:sp>
+        <p:nvSpPr>
+          <p:cNvPr id="3" name="TextBox 2">
+            <a:extLst>
+              <a:ext uri="{FF2B5EF4-FFF2-40B4-BE49-F238E27FC236}">
+                <a16:creationId xmlns:a16="http://schemas.microsoft.com/office/drawing/2014/main" id="{5B831DEF-ED41-44A4-8E64-7DB5A35EC9D1}"/>
+              </a:ext>
+            </a:extLst>
+          </p:cNvPr>
+          <p:cNvSpPr txBox="1"/>
+          <p:nvPr/>
+        </p:nvSpPr>
+        <p:spPr>
+          <a:xfrm>
+            <a:off x="813732" y="1375794"/>
+            <a:ext cx="3372374" cy="3693319"/>
+          </a:xfrm>
+          <a:prstGeom prst="rect">
+            <a:avLst/>
+          </a:prstGeom>
+          <a:noFill/>
+        </p:spPr>
+        <p:txBody>
+          <a:bodyPr wrap="square" rtlCol="0">
+            <a:spAutoFit/>
+          </a:bodyPr>
+          <a:lstStyle/>
+          <a:p>
+            <a:r>
+              <a:rPr lang="en-US" b="1" dirty="0"/>
+              <a:t>Win path:</a:t>
+            </a:r>
+          </a:p>
+          <a:p>
+            <a:pPr marL="342900" indent="-342900">
+              <a:buAutoNum type="arabicPeriod"/>
+            </a:pPr>
+            <a:r>
+              <a:rPr lang="en-US" dirty="0"/>
+              <a:t>Walk to ticket booth</a:t>
+            </a:r>
+          </a:p>
+          <a:p>
+            <a:pPr marL="342900" indent="-342900">
+              <a:buAutoNum type="arabicPeriod"/>
+            </a:pPr>
+            <a:r>
+              <a:rPr lang="en-US" dirty="0"/>
+              <a:t>Buy ticket</a:t>
+            </a:r>
+          </a:p>
+          <a:p>
+            <a:pPr marL="342900" indent="-342900">
+              <a:buAutoNum type="arabicPeriod"/>
+            </a:pPr>
+            <a:r>
+              <a:rPr lang="en-US" dirty="0"/>
+              <a:t>Walk to lobby</a:t>
+            </a:r>
+          </a:p>
+          <a:p>
+            <a:pPr marL="342900" indent="-342900">
+              <a:buAutoNum type="arabicPeriod"/>
+            </a:pPr>
+            <a:r>
+              <a:rPr lang="en-US" dirty="0"/>
+              <a:t>Walk to escalators</a:t>
+            </a:r>
+          </a:p>
+          <a:p>
+            <a:pPr marL="342900" indent="-342900">
+              <a:buAutoNum type="arabicPeriod"/>
+            </a:pPr>
+            <a:r>
+              <a:rPr lang="en-US" dirty="0"/>
+              <a:t>Go either up or down (depending on ticket platform)</a:t>
+            </a:r>
+          </a:p>
+          <a:p>
+            <a:pPr marL="342900" indent="-342900">
+              <a:buAutoNum type="arabicPeriod"/>
+            </a:pPr>
+            <a:r>
+              <a:rPr lang="en-US" dirty="0"/>
+              <a:t>Walk left/right (depending on platform)</a:t>
+            </a:r>
+          </a:p>
+          <a:p>
+            <a:pPr marL="342900" indent="-342900">
+              <a:buAutoNum type="arabicPeriod"/>
+            </a:pPr>
+            <a:r>
+              <a:rPr lang="en-US" dirty="0"/>
+              <a:t>Set alarm to until time = 80</a:t>
+            </a:r>
+          </a:p>
+          <a:p>
+            <a:pPr marL="342900" indent="-342900">
+              <a:buAutoNum type="arabicPeriod"/>
+            </a:pPr>
+            <a:r>
+              <a:rPr lang="en-US" dirty="0"/>
+              <a:t>Sit and wait</a:t>
+            </a:r>
+          </a:p>
+          <a:p>
+            <a:pPr marL="342900" indent="-342900">
+              <a:buAutoNum type="arabicPeriod"/>
+            </a:pPr>
+            <a:r>
+              <a:rPr lang="en-US" dirty="0"/>
+              <a:t>Get on train</a:t>
+            </a:r>
+          </a:p>
+          <a:p>
+            <a:pPr marL="342900" indent="-342900">
+              <a:buAutoNum type="arabicPeriod"/>
+            </a:pPr>
+            <a:r>
+              <a:rPr lang="en-US" dirty="0"/>
+              <a:t>Win</a:t>
+            </a:r>
+          </a:p>
+        </p:txBody>
+      </p:sp>
+      <p:sp>
+        <p:nvSpPr>
+          <p:cNvPr id="4" name="TextBox 3">
+            <a:extLst>
+              <a:ext uri="{FF2B5EF4-FFF2-40B4-BE49-F238E27FC236}">
+                <a16:creationId xmlns:a16="http://schemas.microsoft.com/office/drawing/2014/main" id="{14AAFF1E-9103-47F0-8552-C8D6FFB60483}"/>
+              </a:ext>
+            </a:extLst>
+          </p:cNvPr>
+          <p:cNvSpPr txBox="1"/>
+          <p:nvPr/>
+        </p:nvSpPr>
+        <p:spPr>
+          <a:xfrm>
+            <a:off x="5620624" y="1518407"/>
+            <a:ext cx="3431097" cy="1200329"/>
+          </a:xfrm>
+          <a:prstGeom prst="rect">
+            <a:avLst/>
+          </a:prstGeom>
+          <a:noFill/>
+        </p:spPr>
+        <p:txBody>
+          <a:bodyPr wrap="square" rtlCol="0">
+            <a:spAutoFit/>
+          </a:bodyPr>
+          <a:lstStyle/>
+          <a:p>
+            <a:r>
+              <a:rPr lang="en-US" b="1" dirty="0"/>
+              <a:t>Loss path:</a:t>
+            </a:r>
+            <a:endParaRPr lang="en-US" dirty="0"/>
+          </a:p>
+          <a:p>
+            <a:pPr marL="342900" indent="-342900">
+              <a:buAutoNum type="arabicPeriod"/>
+            </a:pPr>
+            <a:r>
+              <a:rPr lang="en-US" dirty="0"/>
+              <a:t>Walk to seating area</a:t>
+            </a:r>
+          </a:p>
+          <a:p>
+            <a:pPr marL="342900" indent="-342900">
+              <a:buAutoNum type="arabicPeriod"/>
+            </a:pPr>
+            <a:r>
+              <a:rPr lang="en-US" dirty="0"/>
+              <a:t>Sit (asleep? = true)</a:t>
+            </a:r>
+          </a:p>
+          <a:p>
+            <a:pPr marL="342900" indent="-342900">
+              <a:buAutoNum type="arabicPeriod"/>
+            </a:pPr>
+            <a:r>
+              <a:rPr lang="en-US" dirty="0"/>
+              <a:t>Lose</a:t>
+            </a:r>
+          </a:p>
+        </p:txBody>
+      </p:sp>
+    </p:spTree>
+    <p:extLst>
+      <p:ext uri="{BB962C8B-B14F-4D97-AF65-F5344CB8AC3E}">
+        <p14:creationId xmlns:p14="http://schemas.microsoft.com/office/powerpoint/2010/main" val="2112047326"/>
       </p:ext>
     </p:extLst>
   </p:cSld>

</xml_diff>